<commit_message>
Initial architecture slides - work in progress
</commit_message>
<xml_diff>
--- a/Docs/HighLevelArchitecture.pptx
+++ b/Docs/HighLevelArchitecture.pptx
@@ -4308,31 +4308,32 @@
             </a:avLst>
           </a:prstGeom>
           <a:solidFill>
-            <a:schemeClr val="bg1">
-              <a:lumMod val="95000"/>
+            <a:schemeClr val="accent6">
+              <a:lumMod val="20000"/>
+              <a:lumOff val="80000"/>
             </a:schemeClr>
           </a:solidFill>
           <a:ln>
             <a:solidFill>
-              <a:schemeClr val="bg1">
-                <a:lumMod val="85000"/>
+              <a:schemeClr val="accent6">
+                <a:lumMod val="40000"/>
+                <a:lumOff val="60000"/>
               </a:schemeClr>
             </a:solidFill>
-            <a:prstDash val="sysDash"/>
           </a:ln>
         </p:spPr>
         <p:style>
-          <a:lnRef idx="3">
-            <a:schemeClr val="lt1"/>
+          <a:lnRef idx="2">
+            <a:schemeClr val="accent6"/>
           </a:lnRef>
           <a:fillRef idx="1">
-            <a:schemeClr val="accent4"/>
+            <a:schemeClr val="lt1"/>
           </a:fillRef>
-          <a:effectRef idx="1">
-            <a:schemeClr val="accent4"/>
+          <a:effectRef idx="0">
+            <a:schemeClr val="accent6"/>
           </a:effectRef>
           <a:fontRef idx="minor">
-            <a:schemeClr val="lt1"/>
+            <a:schemeClr val="dk1"/>
           </a:fontRef>
         </p:style>
         <p:txBody>
@@ -4348,7 +4349,17 @@
                   </a:schemeClr>
                 </a:solidFill>
               </a:rPr>
-              <a:t>Business tier – server side processes</a:t>
+              <a:t>Application </a:t>
+            </a:r>
+            <a:r>
+              <a:rPr lang="en-US" sz="1600" dirty="0" smtClean="0">
+                <a:solidFill>
+                  <a:schemeClr val="bg1">
+                    <a:lumMod val="50000"/>
+                  </a:schemeClr>
+                </a:solidFill>
+              </a:rPr>
+              <a:t>tier – server side processes</a:t>
             </a:r>
             <a:endParaRPr lang="en-US" sz="1600" dirty="0">
               <a:solidFill>
@@ -4368,7 +4379,7 @@
         </p:nvSpPr>
         <p:spPr>
           <a:xfrm>
-            <a:off x="2648946" y="3422890"/>
+            <a:off x="2648946" y="3375265"/>
             <a:ext cx="858383" cy="565477"/>
           </a:xfrm>
           <a:prstGeom prst="roundRect">
@@ -4376,27 +4387,20 @@
               <a:gd name="adj" fmla="val 0"/>
             </a:avLst>
           </a:prstGeom>
-          <a:solidFill>
-            <a:schemeClr val="bg1">
-              <a:lumMod val="85000"/>
-            </a:schemeClr>
-          </a:solidFill>
-          <a:ln>
-            <a:noFill/>
-          </a:ln>
+          <a:ln/>
         </p:spPr>
         <p:style>
-          <a:lnRef idx="3">
-            <a:schemeClr val="lt1"/>
+          <a:lnRef idx="1">
+            <a:schemeClr val="accent6"/>
           </a:lnRef>
-          <a:fillRef idx="1">
-            <a:schemeClr val="accent2"/>
+          <a:fillRef idx="2">
+            <a:schemeClr val="accent6"/>
           </a:fillRef>
           <a:effectRef idx="1">
-            <a:schemeClr val="accent2"/>
+            <a:schemeClr val="accent6"/>
           </a:effectRef>
           <a:fontRef idx="minor">
-            <a:schemeClr val="lt1"/>
+            <a:schemeClr val="dk1"/>
           </a:fontRef>
         </p:style>
         <p:txBody>
@@ -4423,7 +4427,7 @@
         </p:nvSpPr>
         <p:spPr>
           <a:xfrm>
-            <a:off x="3704586" y="3432592"/>
+            <a:off x="3704586" y="3384967"/>
             <a:ext cx="858383" cy="565477"/>
           </a:xfrm>
           <a:prstGeom prst="roundRect">
@@ -4431,27 +4435,20 @@
               <a:gd name="adj" fmla="val 0"/>
             </a:avLst>
           </a:prstGeom>
-          <a:solidFill>
-            <a:schemeClr val="bg1">
-              <a:lumMod val="85000"/>
-            </a:schemeClr>
-          </a:solidFill>
-          <a:ln>
-            <a:noFill/>
-          </a:ln>
+          <a:ln/>
         </p:spPr>
         <p:style>
-          <a:lnRef idx="3">
-            <a:schemeClr val="lt1"/>
+          <a:lnRef idx="1">
+            <a:schemeClr val="accent6"/>
           </a:lnRef>
-          <a:fillRef idx="1">
-            <a:schemeClr val="accent2"/>
+          <a:fillRef idx="2">
+            <a:schemeClr val="accent6"/>
           </a:fillRef>
           <a:effectRef idx="1">
-            <a:schemeClr val="accent2"/>
+            <a:schemeClr val="accent6"/>
           </a:effectRef>
           <a:fontRef idx="minor">
-            <a:schemeClr val="lt1"/>
+            <a:schemeClr val="dk1"/>
           </a:fontRef>
         </p:style>
         <p:txBody>
@@ -4478,7 +4475,7 @@
         </p:nvSpPr>
         <p:spPr>
           <a:xfrm>
-            <a:off x="2643183" y="4158393"/>
+            <a:off x="2643183" y="4110768"/>
             <a:ext cx="858383" cy="568849"/>
           </a:xfrm>
           <a:prstGeom prst="roundRect">
@@ -4486,27 +4483,20 @@
               <a:gd name="adj" fmla="val 0"/>
             </a:avLst>
           </a:prstGeom>
-          <a:solidFill>
-            <a:schemeClr val="bg1">
-              <a:lumMod val="85000"/>
-            </a:schemeClr>
-          </a:solidFill>
-          <a:ln>
-            <a:noFill/>
-          </a:ln>
+          <a:ln/>
         </p:spPr>
         <p:style>
-          <a:lnRef idx="3">
-            <a:schemeClr val="lt1"/>
+          <a:lnRef idx="1">
+            <a:schemeClr val="accent6"/>
           </a:lnRef>
-          <a:fillRef idx="1">
-            <a:schemeClr val="accent2"/>
+          <a:fillRef idx="2">
+            <a:schemeClr val="accent6"/>
           </a:fillRef>
           <a:effectRef idx="1">
-            <a:schemeClr val="accent2"/>
+            <a:schemeClr val="accent6"/>
           </a:effectRef>
           <a:fontRef idx="minor">
-            <a:schemeClr val="lt1"/>
+            <a:schemeClr val="dk1"/>
           </a:fontRef>
         </p:style>
         <p:txBody>
@@ -4533,7 +4523,7 @@
         </p:nvSpPr>
         <p:spPr>
           <a:xfrm>
-            <a:off x="3704586" y="4174426"/>
+            <a:off x="3704586" y="4126801"/>
             <a:ext cx="858383" cy="552816"/>
           </a:xfrm>
           <a:prstGeom prst="roundRect">
@@ -4541,27 +4531,20 @@
               <a:gd name="adj" fmla="val 0"/>
             </a:avLst>
           </a:prstGeom>
-          <a:solidFill>
-            <a:schemeClr val="bg1">
-              <a:lumMod val="85000"/>
-            </a:schemeClr>
-          </a:solidFill>
-          <a:ln>
-            <a:noFill/>
-          </a:ln>
+          <a:ln/>
         </p:spPr>
         <p:style>
-          <a:lnRef idx="3">
-            <a:schemeClr val="lt1"/>
+          <a:lnRef idx="1">
+            <a:schemeClr val="accent6"/>
           </a:lnRef>
-          <a:fillRef idx="1">
-            <a:schemeClr val="accent2"/>
+          <a:fillRef idx="2">
+            <a:schemeClr val="accent6"/>
           </a:fillRef>
           <a:effectRef idx="1">
-            <a:schemeClr val="accent2"/>
+            <a:schemeClr val="accent6"/>
           </a:effectRef>
           <a:fontRef idx="minor">
-            <a:schemeClr val="lt1"/>
+            <a:schemeClr val="dk1"/>
           </a:fontRef>
         </p:style>
         <p:txBody>
@@ -4588,7 +4571,7 @@
         </p:nvSpPr>
         <p:spPr>
           <a:xfrm>
-            <a:off x="4774708" y="3432592"/>
+            <a:off x="4774708" y="3384967"/>
             <a:ext cx="858383" cy="565477"/>
           </a:xfrm>
           <a:prstGeom prst="roundRect">
@@ -4596,27 +4579,20 @@
               <a:gd name="adj" fmla="val 0"/>
             </a:avLst>
           </a:prstGeom>
-          <a:solidFill>
-            <a:schemeClr val="bg1">
-              <a:lumMod val="85000"/>
-            </a:schemeClr>
-          </a:solidFill>
-          <a:ln>
-            <a:noFill/>
-          </a:ln>
+          <a:ln/>
         </p:spPr>
         <p:style>
-          <a:lnRef idx="3">
-            <a:schemeClr val="lt1"/>
+          <a:lnRef idx="1">
+            <a:schemeClr val="accent6"/>
           </a:lnRef>
-          <a:fillRef idx="1">
-            <a:schemeClr val="accent2"/>
+          <a:fillRef idx="2">
+            <a:schemeClr val="accent6"/>
           </a:fillRef>
           <a:effectRef idx="1">
-            <a:schemeClr val="accent2"/>
+            <a:schemeClr val="accent6"/>
           </a:effectRef>
           <a:fontRef idx="minor">
-            <a:schemeClr val="lt1"/>
+            <a:schemeClr val="dk1"/>
           </a:fontRef>
         </p:style>
         <p:txBody>
@@ -4643,7 +4619,7 @@
         </p:nvSpPr>
         <p:spPr>
           <a:xfrm>
-            <a:off x="4765989" y="4174426"/>
+            <a:off x="4765989" y="4126801"/>
             <a:ext cx="858383" cy="552816"/>
           </a:xfrm>
           <a:prstGeom prst="roundRect">
@@ -4651,27 +4627,20 @@
               <a:gd name="adj" fmla="val 0"/>
             </a:avLst>
           </a:prstGeom>
-          <a:solidFill>
-            <a:schemeClr val="bg1">
-              <a:lumMod val="85000"/>
-            </a:schemeClr>
-          </a:solidFill>
-          <a:ln>
-            <a:noFill/>
-          </a:ln>
+          <a:ln/>
         </p:spPr>
         <p:style>
-          <a:lnRef idx="3">
-            <a:schemeClr val="lt1"/>
+          <a:lnRef idx="1">
+            <a:schemeClr val="accent6"/>
           </a:lnRef>
-          <a:fillRef idx="1">
-            <a:schemeClr val="accent2"/>
+          <a:fillRef idx="2">
+            <a:schemeClr val="accent6"/>
           </a:fillRef>
           <a:effectRef idx="1">
-            <a:schemeClr val="accent2"/>
+            <a:schemeClr val="accent6"/>
           </a:effectRef>
           <a:fontRef idx="minor">
-            <a:schemeClr val="lt1"/>
+            <a:schemeClr val="dk1"/>
           </a:fontRef>
         </p:style>
         <p:txBody>
@@ -4698,7 +4667,7 @@
         </p:nvSpPr>
         <p:spPr>
           <a:xfrm>
-            <a:off x="2790581" y="2527666"/>
+            <a:off x="2988285" y="2527666"/>
             <a:ext cx="157163" cy="147637"/>
           </a:xfrm>
           <a:prstGeom prst="ellipse">
@@ -4738,7 +4707,7 @@
         </p:nvCxnSpPr>
         <p:spPr>
           <a:xfrm flipV="1">
-            <a:off x="2869163" y="2675303"/>
+            <a:off x="3066867" y="2675303"/>
             <a:ext cx="0" cy="216667"/>
           </a:xfrm>
           <a:prstGeom prst="line">
@@ -4787,7 +4756,7 @@
         </p:blipFill>
         <p:spPr>
           <a:xfrm>
-            <a:off x="2084673" y="1324307"/>
+            <a:off x="1542604" y="1070968"/>
             <a:ext cx="1568978" cy="831558"/>
           </a:xfrm>
           <a:prstGeom prst="rect">
@@ -4805,12 +4774,14 @@
           <p:nvPr/>
         </p:nvCxnSpPr>
         <p:spPr>
-          <a:xfrm>
-            <a:off x="2869162" y="2155865"/>
-            <a:ext cx="1" cy="371801"/>
-          </a:xfrm>
-          <a:prstGeom prst="straightConnector1">
-            <a:avLst/>
+          <a:xfrm rot="16200000" flipH="1">
+            <a:off x="2384410" y="1845209"/>
+            <a:ext cx="625140" cy="739774"/>
+          </a:xfrm>
+          <a:prstGeom prst="bentConnector3">
+            <a:avLst>
+              <a:gd name="adj1" fmla="val 50000"/>
+            </a:avLst>
           </a:prstGeom>
           <a:ln>
             <a:tailEnd type="triangle" w="lg" len="lg"/>
@@ -4853,8 +4824,8 @@
         </p:blipFill>
         <p:spPr>
           <a:xfrm>
-            <a:off x="3947424" y="198677"/>
-            <a:ext cx="2315454" cy="1406219"/>
+            <a:off x="3190164" y="198677"/>
+            <a:ext cx="2693771" cy="1406219"/>
           </a:xfrm>
           <a:prstGeom prst="rect">
             <a:avLst/>
@@ -4883,7 +4854,7 @@
         </p:blipFill>
         <p:spPr>
           <a:xfrm>
-            <a:off x="5034559" y="1525901"/>
+            <a:off x="4917811" y="1742351"/>
             <a:ext cx="513071" cy="513071"/>
           </a:xfrm>
           <a:prstGeom prst="rect">
@@ -4913,7 +4884,7 @@
         </p:blipFill>
         <p:spPr>
           <a:xfrm>
-            <a:off x="5082341" y="1590760"/>
+            <a:off x="4965593" y="1807210"/>
             <a:ext cx="513071" cy="513071"/>
           </a:xfrm>
           <a:prstGeom prst="rect">
@@ -4943,7 +4914,7 @@
         </p:blipFill>
         <p:spPr>
           <a:xfrm>
-            <a:off x="5136752" y="1655053"/>
+            <a:off x="5020004" y="1871503"/>
             <a:ext cx="513071" cy="513071"/>
           </a:xfrm>
           <a:prstGeom prst="rect">
@@ -4961,13 +4932,14 @@
         </p:nvCxnSpPr>
         <p:spPr>
           <a:xfrm>
-            <a:off x="4643933" y="1615898"/>
-            <a:ext cx="1" cy="900766"/>
+            <a:off x="4457700" y="1569720"/>
+            <a:ext cx="3756" cy="946944"/>
           </a:xfrm>
           <a:prstGeom prst="straightConnector1">
             <a:avLst/>
           </a:prstGeom>
           <a:ln>
+            <a:headEnd type="triangle" w="lg" len="lg"/>
             <a:tailEnd type="triangle" w="lg" len="lg"/>
           </a:ln>
         </p:spPr>
@@ -4990,20 +4962,20 @@
         <p:nvCxnSpPr>
           <p:cNvPr id="64" name="Straight Arrow Connector 63"/>
           <p:cNvCxnSpPr>
-            <a:stCxn id="51" idx="2"/>
             <a:endCxn id="80" idx="0"/>
           </p:cNvCxnSpPr>
           <p:nvPr/>
         </p:nvCxnSpPr>
         <p:spPr>
           <a:xfrm>
-            <a:off x="5393288" y="2168124"/>
-            <a:ext cx="0" cy="359542"/>
+            <a:off x="5194300" y="2292350"/>
+            <a:ext cx="1276" cy="235316"/>
           </a:xfrm>
           <a:prstGeom prst="straightConnector1">
             <a:avLst/>
           </a:prstGeom>
           <a:ln>
+            <a:headEnd type="none" w="lg" len="lg"/>
             <a:tailEnd type="triangle" w="lg" len="lg"/>
           </a:ln>
         </p:spPr>
@@ -5030,7 +5002,7 @@
         </p:nvSpPr>
         <p:spPr>
           <a:xfrm>
-            <a:off x="2364816" y="5160142"/>
+            <a:off x="2364816" y="4960117"/>
             <a:ext cx="3534206" cy="1150605"/>
           </a:xfrm>
           <a:prstGeom prst="roundRect">
@@ -5039,31 +5011,32 @@
             </a:avLst>
           </a:prstGeom>
           <a:solidFill>
-            <a:schemeClr val="bg1">
-              <a:lumMod val="95000"/>
+            <a:schemeClr val="accent2">
+              <a:lumMod val="20000"/>
+              <a:lumOff val="80000"/>
             </a:schemeClr>
           </a:solidFill>
           <a:ln>
             <a:solidFill>
-              <a:schemeClr val="bg1">
-                <a:lumMod val="85000"/>
+              <a:schemeClr val="accent2">
+                <a:lumMod val="40000"/>
+                <a:lumOff val="60000"/>
               </a:schemeClr>
             </a:solidFill>
-            <a:prstDash val="sysDash"/>
           </a:ln>
         </p:spPr>
         <p:style>
-          <a:lnRef idx="3">
-            <a:schemeClr val="lt1"/>
+          <a:lnRef idx="2">
+            <a:schemeClr val="accent2"/>
           </a:lnRef>
           <a:fillRef idx="1">
-            <a:schemeClr val="accent4"/>
+            <a:schemeClr val="lt1"/>
           </a:fillRef>
-          <a:effectRef idx="1">
-            <a:schemeClr val="accent4"/>
+          <a:effectRef idx="0">
+            <a:schemeClr val="accent2"/>
           </a:effectRef>
           <a:fontRef idx="minor">
-            <a:schemeClr val="lt1"/>
+            <a:schemeClr val="dk1"/>
           </a:fontRef>
         </p:style>
         <p:txBody>
@@ -5079,17 +5052,7 @@
                   </a:schemeClr>
                 </a:solidFill>
               </a:rPr>
-              <a:t>Data </a:t>
-            </a:r>
-            <a:r>
-              <a:rPr lang="en-US" sz="1600" dirty="0" smtClean="0">
-                <a:solidFill>
-                  <a:schemeClr val="bg1">
-                    <a:lumMod val="50000"/>
-                  </a:schemeClr>
-                </a:solidFill>
-              </a:rPr>
-              <a:t>tier – databases</a:t>
+              <a:t>Data tier – databases</a:t>
             </a:r>
             <a:endParaRPr lang="en-US" sz="1600" dirty="0">
               <a:solidFill>
@@ -5109,7 +5072,7 @@
         </p:nvSpPr>
         <p:spPr>
           <a:xfrm>
-            <a:off x="2986282" y="5431561"/>
+            <a:off x="2986282" y="5231536"/>
             <a:ext cx="980436" cy="504825"/>
           </a:xfrm>
           <a:prstGeom prst="flowChartMagneticDisk">
@@ -5118,13 +5081,13 @@
         </p:spPr>
         <p:style>
           <a:lnRef idx="1">
-            <a:schemeClr val="accent3"/>
+            <a:schemeClr val="accent2"/>
           </a:lnRef>
           <a:fillRef idx="2">
-            <a:schemeClr val="accent3"/>
+            <a:schemeClr val="accent2"/>
           </a:fillRef>
           <a:effectRef idx="1">
-            <a:schemeClr val="accent3"/>
+            <a:schemeClr val="accent2"/>
           </a:effectRef>
           <a:fontRef idx="minor">
             <a:schemeClr val="dk1"/>
@@ -5147,7 +5110,7 @@
         </p:nvSpPr>
         <p:spPr>
           <a:xfrm>
-            <a:off x="4251913" y="5324476"/>
+            <a:off x="4251913" y="5124451"/>
             <a:ext cx="980436" cy="611912"/>
           </a:xfrm>
           <a:prstGeom prst="flowChartMagneticDisk">
@@ -5156,13 +5119,13 @@
         </p:spPr>
         <p:style>
           <a:lnRef idx="1">
-            <a:schemeClr val="accent3"/>
+            <a:schemeClr val="accent2"/>
           </a:lnRef>
           <a:fillRef idx="2">
-            <a:schemeClr val="accent3"/>
+            <a:schemeClr val="accent2"/>
           </a:fillRef>
           <a:effectRef idx="1">
-            <a:schemeClr val="accent3"/>
+            <a:schemeClr val="accent2"/>
           </a:effectRef>
           <a:fontRef idx="minor">
             <a:schemeClr val="dk1"/>
@@ -5185,7 +5148,7 @@
         </p:nvSpPr>
         <p:spPr>
           <a:xfrm>
-            <a:off x="4565352" y="2516664"/>
+            <a:off x="4382874" y="2516664"/>
             <a:ext cx="157163" cy="147637"/>
           </a:xfrm>
           <a:prstGeom prst="ellipse">
@@ -5225,7 +5188,7 @@
         </p:nvCxnSpPr>
         <p:spPr>
           <a:xfrm flipV="1">
-            <a:off x="4643934" y="2664301"/>
+            <a:off x="4461456" y="2664301"/>
             <a:ext cx="0" cy="216667"/>
           </a:xfrm>
           <a:prstGeom prst="line">
@@ -5260,7 +5223,7 @@
         </p:nvSpPr>
         <p:spPr>
           <a:xfrm>
-            <a:off x="5314706" y="2527666"/>
+            <a:off x="5116994" y="2527666"/>
             <a:ext cx="157163" cy="147637"/>
           </a:xfrm>
           <a:prstGeom prst="ellipse">
@@ -5300,7 +5263,7 @@
         </p:nvCxnSpPr>
         <p:spPr>
           <a:xfrm flipV="1">
-            <a:off x="5393288" y="2675303"/>
+            <a:off x="5195576" y="2675303"/>
             <a:ext cx="0" cy="216667"/>
           </a:xfrm>
           <a:prstGeom prst="line">
@@ -5327,6 +5290,238 @@
           </a:fontRef>
         </p:style>
       </p:cxnSp>
+      <p:sp>
+        <p:nvSpPr>
+          <p:cNvPr id="14" name="TextBox 13"/>
+          <p:cNvSpPr txBox="1"/>
+          <p:nvPr/>
+        </p:nvSpPr>
+        <p:spPr>
+          <a:xfrm>
+            <a:off x="3949713" y="876208"/>
+            <a:ext cx="1552989" cy="338554"/>
+          </a:xfrm>
+          <a:prstGeom prst="rect">
+            <a:avLst/>
+          </a:prstGeom>
+          <a:noFill/>
+        </p:spPr>
+        <p:txBody>
+          <a:bodyPr wrap="none" rtlCol="0">
+            <a:spAutoFit/>
+          </a:bodyPr>
+          <a:lstStyle/>
+          <a:p>
+            <a:r>
+              <a:rPr lang="en-US" sz="1600" dirty="0" smtClean="0"/>
+              <a:t>B2B integrations</a:t>
+            </a:r>
+            <a:endParaRPr lang="en-US" sz="1600" dirty="0"/>
+          </a:p>
+        </p:txBody>
+      </p:sp>
+      <p:sp>
+        <p:nvSpPr>
+          <p:cNvPr id="33" name="TextBox 32"/>
+          <p:cNvSpPr txBox="1"/>
+          <p:nvPr/>
+        </p:nvSpPr>
+        <p:spPr>
+          <a:xfrm>
+            <a:off x="1542604" y="445828"/>
+            <a:ext cx="1777025" cy="584775"/>
+          </a:xfrm>
+          <a:prstGeom prst="rect">
+            <a:avLst/>
+          </a:prstGeom>
+          <a:noFill/>
+        </p:spPr>
+        <p:txBody>
+          <a:bodyPr wrap="none" rtlCol="0">
+            <a:spAutoFit/>
+          </a:bodyPr>
+          <a:lstStyle/>
+          <a:p>
+            <a:pPr algn="ctr"/>
+            <a:r>
+              <a:rPr lang="en-US" sz="1600" dirty="0" smtClean="0"/>
+              <a:t>Presentation tier – </a:t>
+            </a:r>
+            <a:br>
+              <a:rPr lang="en-US" sz="1600" dirty="0" smtClean="0"/>
+            </a:br>
+            <a:r>
+              <a:rPr lang="en-US" sz="1600" dirty="0" smtClean="0"/>
+              <a:t>client apps</a:t>
+            </a:r>
+            <a:endParaRPr lang="en-US" sz="1600" dirty="0"/>
+          </a:p>
+        </p:txBody>
+      </p:sp>
+      <p:cxnSp>
+        <p:nvCxnSpPr>
+          <p:cNvPr id="29" name="Straight Arrow Connector 36"/>
+          <p:cNvCxnSpPr>
+            <a:endCxn id="16" idx="0"/>
+          </p:cNvCxnSpPr>
+          <p:nvPr/>
+        </p:nvCxnSpPr>
+        <p:spPr>
+          <a:xfrm rot="5400000">
+            <a:off x="2957922" y="1634848"/>
+            <a:ext cx="1001763" cy="783872"/>
+          </a:xfrm>
+          <a:prstGeom prst="bentConnector3">
+            <a:avLst>
+              <a:gd name="adj1" fmla="val 69017"/>
+            </a:avLst>
+          </a:prstGeom>
+          <a:ln>
+            <a:tailEnd type="triangle" w="lg" len="lg"/>
+          </a:ln>
+        </p:spPr>
+        <p:style>
+          <a:lnRef idx="3">
+            <a:schemeClr val="accent1"/>
+          </a:lnRef>
+          <a:fillRef idx="0">
+            <a:schemeClr val="accent1"/>
+          </a:fillRef>
+          <a:effectRef idx="2">
+            <a:schemeClr val="accent1"/>
+          </a:effectRef>
+          <a:fontRef idx="minor">
+            <a:schemeClr val="tx1"/>
+          </a:fontRef>
+        </p:style>
+      </p:cxnSp>
+      <p:cxnSp>
+        <p:nvCxnSpPr>
+          <p:cNvPr id="42" name="Straight Arrow Connector 41"/>
+          <p:cNvCxnSpPr/>
+          <p:nvPr/>
+        </p:nvCxnSpPr>
+        <p:spPr>
+          <a:xfrm flipH="1" flipV="1">
+            <a:off x="5190699" y="1580500"/>
+            <a:ext cx="3601" cy="280050"/>
+          </a:xfrm>
+          <a:prstGeom prst="straightConnector1">
+            <a:avLst/>
+          </a:prstGeom>
+          <a:ln>
+            <a:headEnd type="none" w="lg" len="lg"/>
+            <a:tailEnd type="triangle" w="lg" len="lg"/>
+          </a:ln>
+        </p:spPr>
+        <p:style>
+          <a:lnRef idx="3">
+            <a:schemeClr val="accent1"/>
+          </a:lnRef>
+          <a:fillRef idx="0">
+            <a:schemeClr val="accent1"/>
+          </a:fillRef>
+          <a:effectRef idx="2">
+            <a:schemeClr val="accent1"/>
+          </a:effectRef>
+          <a:fontRef idx="minor">
+            <a:schemeClr val="tx1"/>
+          </a:fontRef>
+        </p:style>
+      </p:cxnSp>
+      <p:sp>
+        <p:nvSpPr>
+          <p:cNvPr id="52" name="TextBox 51"/>
+          <p:cNvSpPr txBox="1"/>
+          <p:nvPr/>
+        </p:nvSpPr>
+        <p:spPr>
+          <a:xfrm>
+            <a:off x="2434390" y="2430759"/>
+            <a:ext cx="588431" cy="338554"/>
+          </a:xfrm>
+          <a:prstGeom prst="rect">
+            <a:avLst/>
+          </a:prstGeom>
+          <a:noFill/>
+        </p:spPr>
+        <p:txBody>
+          <a:bodyPr wrap="none" rtlCol="0">
+            <a:spAutoFit/>
+          </a:bodyPr>
+          <a:lstStyle/>
+          <a:p>
+            <a:pPr algn="ctr"/>
+            <a:r>
+              <a:rPr lang="en-US" sz="1600" dirty="0" smtClean="0"/>
+              <a:t>REST</a:t>
+            </a:r>
+            <a:endParaRPr lang="en-US" sz="1600" dirty="0"/>
+          </a:p>
+        </p:txBody>
+      </p:sp>
+      <p:sp>
+        <p:nvSpPr>
+          <p:cNvPr id="53" name="TextBox 52"/>
+          <p:cNvSpPr txBox="1"/>
+          <p:nvPr/>
+        </p:nvSpPr>
+        <p:spPr>
+          <a:xfrm>
+            <a:off x="3581567" y="2430759"/>
+            <a:ext cx="818365" cy="338554"/>
+          </a:xfrm>
+          <a:prstGeom prst="rect">
+            <a:avLst/>
+          </a:prstGeom>
+          <a:noFill/>
+        </p:spPr>
+        <p:txBody>
+          <a:bodyPr wrap="none" rtlCol="0">
+            <a:spAutoFit/>
+          </a:bodyPr>
+          <a:lstStyle/>
+          <a:p>
+            <a:pPr algn="ctr"/>
+            <a:r>
+              <a:rPr lang="en-US" sz="1600" dirty="0" smtClean="0"/>
+              <a:t>Custom</a:t>
+            </a:r>
+            <a:endParaRPr lang="en-US" sz="1600" dirty="0"/>
+          </a:p>
+        </p:txBody>
+      </p:sp>
+      <p:sp>
+        <p:nvSpPr>
+          <p:cNvPr id="55" name="TextBox 54"/>
+          <p:cNvSpPr txBox="1"/>
+          <p:nvPr/>
+        </p:nvSpPr>
+        <p:spPr>
+          <a:xfrm>
+            <a:off x="5255325" y="2428998"/>
+            <a:ext cx="497251" cy="338554"/>
+          </a:xfrm>
+          <a:prstGeom prst="rect">
+            <a:avLst/>
+          </a:prstGeom>
+          <a:noFill/>
+        </p:spPr>
+        <p:txBody>
+          <a:bodyPr wrap="none" rtlCol="0">
+            <a:spAutoFit/>
+          </a:bodyPr>
+          <a:lstStyle/>
+          <a:p>
+            <a:pPr algn="ctr"/>
+            <a:r>
+              <a:rPr lang="en-US" sz="1600" dirty="0" smtClean="0"/>
+              <a:t>MQ</a:t>
+            </a:r>
+            <a:endParaRPr lang="en-US" sz="1600" dirty="0"/>
+          </a:p>
+        </p:txBody>
+      </p:sp>
     </p:spTree>
     <p:extLst>
       <p:ext uri="{BB962C8B-B14F-4D97-AF65-F5344CB8AC3E}">

</xml_diff>

<commit_message>
Core/Kernel + Core/Microservices: simplification + testing - WIP 3
</commit_message>
<xml_diff>
--- a/Docs/HighLevelArchitecture.pptx
+++ b/Docs/HighLevelArchitecture.pptx
@@ -249,7 +249,7 @@
           <a:p>
             <a:fld id="{BC09DC50-E35C-4067-872A-09A9CC66B9DA}" type="datetimeFigureOut">
               <a:rPr lang="en-US" smtClean="0"/>
-              <a:t>9/20/2017</a:t>
+              <a:t>9/23/2017</a:t>
             </a:fld>
             <a:endParaRPr lang="en-US"/>
           </a:p>
@@ -417,7 +417,7 @@
           <a:p>
             <a:fld id="{BC09DC50-E35C-4067-872A-09A9CC66B9DA}" type="datetimeFigureOut">
               <a:rPr lang="en-US" smtClean="0"/>
-              <a:t>9/20/2017</a:t>
+              <a:t>9/23/2017</a:t>
             </a:fld>
             <a:endParaRPr lang="en-US"/>
           </a:p>
@@ -595,7 +595,7 @@
           <a:p>
             <a:fld id="{BC09DC50-E35C-4067-872A-09A9CC66B9DA}" type="datetimeFigureOut">
               <a:rPr lang="en-US" smtClean="0"/>
-              <a:t>9/20/2017</a:t>
+              <a:t>9/23/2017</a:t>
             </a:fld>
             <a:endParaRPr lang="en-US"/>
           </a:p>
@@ -763,7 +763,7 @@
           <a:p>
             <a:fld id="{BC09DC50-E35C-4067-872A-09A9CC66B9DA}" type="datetimeFigureOut">
               <a:rPr lang="en-US" smtClean="0"/>
-              <a:t>9/20/2017</a:t>
+              <a:t>9/23/2017</a:t>
             </a:fld>
             <a:endParaRPr lang="en-US"/>
           </a:p>
@@ -1008,7 +1008,7 @@
           <a:p>
             <a:fld id="{BC09DC50-E35C-4067-872A-09A9CC66B9DA}" type="datetimeFigureOut">
               <a:rPr lang="en-US" smtClean="0"/>
-              <a:t>9/20/2017</a:t>
+              <a:t>9/23/2017</a:t>
             </a:fld>
             <a:endParaRPr lang="en-US"/>
           </a:p>
@@ -1237,7 +1237,7 @@
           <a:p>
             <a:fld id="{BC09DC50-E35C-4067-872A-09A9CC66B9DA}" type="datetimeFigureOut">
               <a:rPr lang="en-US" smtClean="0"/>
-              <a:t>9/20/2017</a:t>
+              <a:t>9/23/2017</a:t>
             </a:fld>
             <a:endParaRPr lang="en-US"/>
           </a:p>
@@ -1601,7 +1601,7 @@
           <a:p>
             <a:fld id="{BC09DC50-E35C-4067-872A-09A9CC66B9DA}" type="datetimeFigureOut">
               <a:rPr lang="en-US" smtClean="0"/>
-              <a:t>9/20/2017</a:t>
+              <a:t>9/23/2017</a:t>
             </a:fld>
             <a:endParaRPr lang="en-US"/>
           </a:p>
@@ -1718,7 +1718,7 @@
           <a:p>
             <a:fld id="{BC09DC50-E35C-4067-872A-09A9CC66B9DA}" type="datetimeFigureOut">
               <a:rPr lang="en-US" smtClean="0"/>
-              <a:t>9/20/2017</a:t>
+              <a:t>9/23/2017</a:t>
             </a:fld>
             <a:endParaRPr lang="en-US"/>
           </a:p>
@@ -1813,7 +1813,7 @@
           <a:p>
             <a:fld id="{BC09DC50-E35C-4067-872A-09A9CC66B9DA}" type="datetimeFigureOut">
               <a:rPr lang="en-US" smtClean="0"/>
-              <a:t>9/20/2017</a:t>
+              <a:t>9/23/2017</a:t>
             </a:fld>
             <a:endParaRPr lang="en-US"/>
           </a:p>
@@ -2088,7 +2088,7 @@
           <a:p>
             <a:fld id="{BC09DC50-E35C-4067-872A-09A9CC66B9DA}" type="datetimeFigureOut">
               <a:rPr lang="en-US" smtClean="0"/>
-              <a:t>9/20/2017</a:t>
+              <a:t>9/23/2017</a:t>
             </a:fld>
             <a:endParaRPr lang="en-US"/>
           </a:p>
@@ -2340,7 +2340,7 @@
           <a:p>
             <a:fld id="{BC09DC50-E35C-4067-872A-09A9CC66B9DA}" type="datetimeFigureOut">
               <a:rPr lang="en-US" smtClean="0"/>
-              <a:t>9/20/2017</a:t>
+              <a:t>9/23/2017</a:t>
             </a:fld>
             <a:endParaRPr lang="en-US"/>
           </a:p>
@@ -2551,7 +2551,7 @@
           <a:p>
             <a:fld id="{BC09DC50-E35C-4067-872A-09A9CC66B9DA}" type="datetimeFigureOut">
               <a:rPr lang="en-US" smtClean="0"/>
-              <a:t>9/20/2017</a:t>
+              <a:t>9/23/2017</a:t>
             </a:fld>
             <a:endParaRPr lang="en-US"/>
           </a:p>
@@ -3207,7 +3207,7 @@
           <a:p>
             <a:pPr algn="ctr"/>
             <a:r>
-              <a:rPr lang="en-US" sz="1100" b="1" dirty="0">
+              <a:rPr lang="en-US" sz="1100" b="1" dirty="0" smtClean="0">
                 <a:solidFill>
                   <a:schemeClr val="accent2">
                     <a:lumMod val="50000"/>
@@ -3271,7 +3271,7 @@
           <a:p>
             <a:pPr algn="ctr"/>
             <a:r>
-              <a:rPr lang="en-US" sz="1100" b="1" dirty="0">
+              <a:rPr lang="en-US" sz="1100" b="1" dirty="0" smtClean="0">
                 <a:solidFill>
                   <a:srgbClr val="00B050"/>
                 </a:solidFill>

</xml_diff>